<commit_message>
Clean up horizontal landing section.
</commit_message>
<xml_diff>
--- a/paper/figures/delta v r versus chi r.pptx
+++ b/paper/figures/delta v r versus chi r.pptx
@@ -6,6 +6,7 @@
   </p:sldMasterIdLst>
   <p:sldIdLst>
     <p:sldId id="257" r:id="rId2"/>
+    <p:sldId id="258" r:id="rId3"/>
   </p:sldIdLst>
   <p:sldSz cx="12192000" cy="6858000"/>
   <p:notesSz cx="6858000" cy="9144000"/>
@@ -104,6 +105,11 @@
       </a:defRPr>
     </a:lvl9pPr>
   </p:defaultTextStyle>
+  <p:extLst>
+    <p:ext uri="{EFAFB233-063F-42B5-8137-9DF3F51BA10A}">
+      <p15:sldGuideLst xmlns:p15="http://schemas.microsoft.com/office/powerpoint/2012/main"/>
+    </p:ext>
+  </p:extLst>
 </p:presentation>
 </file>
 
@@ -238,7 +244,7 @@
           <a:p>
             <a:fld id="{72D081A1-8A07-4D34-A3B6-FC04CD0FF293}" type="datetimeFigureOut">
               <a:rPr lang="en-US" smtClean="0"/>
-              <a:t>2/18/2018</a:t>
+              <a:t>2/25/2018</a:t>
             </a:fld>
             <a:endParaRPr lang="en-US"/>
           </a:p>
@@ -408,7 +414,7 @@
           <a:p>
             <a:fld id="{72D081A1-8A07-4D34-A3B6-FC04CD0FF293}" type="datetimeFigureOut">
               <a:rPr lang="en-US" smtClean="0"/>
-              <a:t>2/18/2018</a:t>
+              <a:t>2/25/2018</a:t>
             </a:fld>
             <a:endParaRPr lang="en-US"/>
           </a:p>
@@ -588,7 +594,7 @@
           <a:p>
             <a:fld id="{72D081A1-8A07-4D34-A3B6-FC04CD0FF293}" type="datetimeFigureOut">
               <a:rPr lang="en-US" smtClean="0"/>
-              <a:t>2/18/2018</a:t>
+              <a:t>2/25/2018</a:t>
             </a:fld>
             <a:endParaRPr lang="en-US"/>
           </a:p>
@@ -758,7 +764,7 @@
           <a:p>
             <a:fld id="{72D081A1-8A07-4D34-A3B6-FC04CD0FF293}" type="datetimeFigureOut">
               <a:rPr lang="en-US" smtClean="0"/>
-              <a:t>2/18/2018</a:t>
+              <a:t>2/25/2018</a:t>
             </a:fld>
             <a:endParaRPr lang="en-US"/>
           </a:p>
@@ -1004,7 +1010,7 @@
           <a:p>
             <a:fld id="{72D081A1-8A07-4D34-A3B6-FC04CD0FF293}" type="datetimeFigureOut">
               <a:rPr lang="en-US" smtClean="0"/>
-              <a:t>2/18/2018</a:t>
+              <a:t>2/25/2018</a:t>
             </a:fld>
             <a:endParaRPr lang="en-US"/>
           </a:p>
@@ -1236,7 +1242,7 @@
           <a:p>
             <a:fld id="{72D081A1-8A07-4D34-A3B6-FC04CD0FF293}" type="datetimeFigureOut">
               <a:rPr lang="en-US" smtClean="0"/>
-              <a:t>2/18/2018</a:t>
+              <a:t>2/25/2018</a:t>
             </a:fld>
             <a:endParaRPr lang="en-US"/>
           </a:p>
@@ -1603,7 +1609,7 @@
           <a:p>
             <a:fld id="{72D081A1-8A07-4D34-A3B6-FC04CD0FF293}" type="datetimeFigureOut">
               <a:rPr lang="en-US" smtClean="0"/>
-              <a:t>2/18/2018</a:t>
+              <a:t>2/25/2018</a:t>
             </a:fld>
             <a:endParaRPr lang="en-US"/>
           </a:p>
@@ -1721,7 +1727,7 @@
           <a:p>
             <a:fld id="{72D081A1-8A07-4D34-A3B6-FC04CD0FF293}" type="datetimeFigureOut">
               <a:rPr lang="en-US" smtClean="0"/>
-              <a:t>2/18/2018</a:t>
+              <a:t>2/25/2018</a:t>
             </a:fld>
             <a:endParaRPr lang="en-US"/>
           </a:p>
@@ -1816,7 +1822,7 @@
           <a:p>
             <a:fld id="{72D081A1-8A07-4D34-A3B6-FC04CD0FF293}" type="datetimeFigureOut">
               <a:rPr lang="en-US" smtClean="0"/>
-              <a:t>2/18/2018</a:t>
+              <a:t>2/25/2018</a:t>
             </a:fld>
             <a:endParaRPr lang="en-US"/>
           </a:p>
@@ -2093,7 +2099,7 @@
           <a:p>
             <a:fld id="{72D081A1-8A07-4D34-A3B6-FC04CD0FF293}" type="datetimeFigureOut">
               <a:rPr lang="en-US" smtClean="0"/>
-              <a:t>2/18/2018</a:t>
+              <a:t>2/25/2018</a:t>
             </a:fld>
             <a:endParaRPr lang="en-US"/>
           </a:p>
@@ -2346,7 +2352,7 @@
           <a:p>
             <a:fld id="{72D081A1-8A07-4D34-A3B6-FC04CD0FF293}" type="datetimeFigureOut">
               <a:rPr lang="en-US" smtClean="0"/>
-              <a:t>2/18/2018</a:t>
+              <a:t>2/25/2018</a:t>
             </a:fld>
             <a:endParaRPr lang="en-US"/>
           </a:p>
@@ -2559,7 +2565,7 @@
           <a:p>
             <a:fld id="{72D081A1-8A07-4D34-A3B6-FC04CD0FF293}" type="datetimeFigureOut">
               <a:rPr lang="en-US" smtClean="0"/>
-              <a:t>2/18/2018</a:t>
+              <a:t>2/25/2018</a:t>
             </a:fld>
             <a:endParaRPr lang="en-US"/>
           </a:p>
@@ -3583,6 +3589,847 @@
 </p:sld>
 </file>
 
+<file path=ppt/slides/slide2.xml><?xml version="1.0" encoding="utf-8"?>
+<p:sld xmlns:a="http://schemas.openxmlformats.org/drawingml/2006/main" xmlns:r="http://schemas.openxmlformats.org/officeDocument/2006/relationships" xmlns:p="http://schemas.openxmlformats.org/presentationml/2006/main">
+  <p:cSld>
+    <p:spTree>
+      <p:nvGrpSpPr>
+        <p:cNvPr id="1" name=""/>
+        <p:cNvGrpSpPr/>
+        <p:nvPr/>
+      </p:nvGrpSpPr>
+      <p:grpSpPr>
+        <a:xfrm>
+          <a:off x="0" y="0"/>
+          <a:ext cx="0" cy="0"/>
+          <a:chOff x="0" y="0"/>
+          <a:chExt cx="0" cy="0"/>
+        </a:xfrm>
+      </p:grpSpPr>
+      <p:pic>
+        <p:nvPicPr>
+          <p:cNvPr id="4" name="Picture 3"/>
+          <p:cNvPicPr>
+            <a:picLocks noChangeAspect="1"/>
+          </p:cNvPicPr>
+          <p:nvPr/>
+        </p:nvPicPr>
+        <p:blipFill>
+          <a:blip r:embed="rId2">
+            <a:extLst>
+              <a:ext uri="{28A0092B-C50C-407E-A947-70E740481C1C}">
+                <a14:useLocalDpi xmlns:a14="http://schemas.microsoft.com/office/drawing/2010/main" val="0"/>
+              </a:ext>
+            </a:extLst>
+          </a:blip>
+          <a:stretch>
+            <a:fillRect/>
+          </a:stretch>
+        </p:blipFill>
+        <p:spPr>
+          <a:xfrm>
+            <a:off x="609589" y="685794"/>
+            <a:ext cx="10972822" cy="5486411"/>
+          </a:xfrm>
+          <a:prstGeom prst="rect">
+            <a:avLst/>
+          </a:prstGeom>
+        </p:spPr>
+      </p:pic>
+      <p:sp>
+        <p:nvSpPr>
+          <p:cNvPr id="5" name="Rectangle 4"/>
+          <p:cNvSpPr/>
+          <p:nvPr/>
+        </p:nvSpPr>
+        <p:spPr>
+          <a:xfrm>
+            <a:off x="2127128" y="5503334"/>
+            <a:ext cx="1005840" cy="91440"/>
+          </a:xfrm>
+          <a:prstGeom prst="rect">
+            <a:avLst/>
+          </a:prstGeom>
+          <a:solidFill>
+            <a:schemeClr val="accent1">
+              <a:lumMod val="40000"/>
+              <a:lumOff val="60000"/>
+            </a:schemeClr>
+          </a:solidFill>
+        </p:spPr>
+        <p:style>
+          <a:lnRef idx="2">
+            <a:schemeClr val="accent1">
+              <a:shade val="50000"/>
+            </a:schemeClr>
+          </a:lnRef>
+          <a:fillRef idx="1">
+            <a:schemeClr val="accent1"/>
+          </a:fillRef>
+          <a:effectRef idx="0">
+            <a:schemeClr val="accent1"/>
+          </a:effectRef>
+          <a:fontRef idx="minor">
+            <a:schemeClr val="lt1"/>
+          </a:fontRef>
+        </p:style>
+        <p:txBody>
+          <a:bodyPr rtlCol="0" anchor="ctr"/>
+          <a:lstStyle/>
+          <a:p>
+            <a:pPr algn="ctr"/>
+            <a:endParaRPr lang="en-US"/>
+          </a:p>
+        </p:txBody>
+      </p:sp>
+      <p:sp>
+        <p:nvSpPr>
+          <p:cNvPr id="6" name="TextBox 5"/>
+          <p:cNvSpPr txBox="1"/>
+          <p:nvPr/>
+        </p:nvSpPr>
+        <p:spPr>
+          <a:xfrm>
+            <a:off x="2127128" y="5302833"/>
+            <a:ext cx="856325" cy="246221"/>
+          </a:xfrm>
+          <a:prstGeom prst="rect">
+            <a:avLst/>
+          </a:prstGeom>
+          <a:noFill/>
+        </p:spPr>
+        <p:txBody>
+          <a:bodyPr wrap="none" rtlCol="0">
+            <a:spAutoFit/>
+          </a:bodyPr>
+          <a:lstStyle/>
+          <a:p>
+            <a:r>
+              <a:rPr lang="en-US" sz="1000" dirty="0" smtClean="0"/>
+              <a:t>Wing (glider)</a:t>
+            </a:r>
+            <a:endParaRPr lang="en-US" sz="1000" dirty="0"/>
+          </a:p>
+        </p:txBody>
+      </p:sp>
+      <p:sp>
+        <p:nvSpPr>
+          <p:cNvPr id="7" name="Rectangle 6"/>
+          <p:cNvSpPr/>
+          <p:nvPr/>
+        </p:nvSpPr>
+        <p:spPr>
+          <a:xfrm>
+            <a:off x="2630048" y="4892035"/>
+            <a:ext cx="1078352" cy="213364"/>
+          </a:xfrm>
+          <a:prstGeom prst="rect">
+            <a:avLst/>
+          </a:prstGeom>
+          <a:solidFill>
+            <a:schemeClr val="accent6">
+              <a:lumMod val="40000"/>
+              <a:lumOff val="60000"/>
+            </a:schemeClr>
+          </a:solidFill>
+        </p:spPr>
+        <p:style>
+          <a:lnRef idx="2">
+            <a:schemeClr val="accent1">
+              <a:shade val="50000"/>
+            </a:schemeClr>
+          </a:lnRef>
+          <a:fillRef idx="1">
+            <a:schemeClr val="accent1"/>
+          </a:fillRef>
+          <a:effectRef idx="0">
+            <a:schemeClr val="accent1"/>
+          </a:effectRef>
+          <a:fontRef idx="minor">
+            <a:schemeClr val="lt1"/>
+          </a:fontRef>
+        </p:style>
+        <p:txBody>
+          <a:bodyPr rtlCol="0" anchor="ctr"/>
+          <a:lstStyle/>
+          <a:p>
+            <a:pPr algn="ctr"/>
+            <a:endParaRPr lang="en-US"/>
+          </a:p>
+        </p:txBody>
+      </p:sp>
+      <p:sp>
+        <p:nvSpPr>
+          <p:cNvPr id="8" name="TextBox 7"/>
+          <p:cNvSpPr txBox="1"/>
+          <p:nvPr/>
+        </p:nvSpPr>
+        <p:spPr>
+          <a:xfrm>
+            <a:off x="2536694" y="4833251"/>
+            <a:ext cx="1239442" cy="246221"/>
+          </a:xfrm>
+          <a:prstGeom prst="rect">
+            <a:avLst/>
+          </a:prstGeom>
+          <a:noFill/>
+        </p:spPr>
+        <p:txBody>
+          <a:bodyPr wrap="none" rtlCol="0">
+            <a:spAutoFit/>
+          </a:bodyPr>
+          <a:lstStyle/>
+          <a:p>
+            <a:r>
+              <a:rPr lang="en-US" sz="1000" dirty="0" smtClean="0"/>
+              <a:t>Wing (air-breathing)</a:t>
+            </a:r>
+            <a:endParaRPr lang="en-US" sz="1000" dirty="0"/>
+          </a:p>
+        </p:txBody>
+      </p:sp>
+      <p:cxnSp>
+        <p:nvCxnSpPr>
+          <p:cNvPr id="10" name="Straight Connector 9"/>
+          <p:cNvCxnSpPr/>
+          <p:nvPr/>
+        </p:nvCxnSpPr>
+        <p:spPr>
+          <a:xfrm>
+            <a:off x="1227667" y="5020733"/>
+            <a:ext cx="4699000" cy="0"/>
+          </a:xfrm>
+          <a:prstGeom prst="line">
+            <a:avLst/>
+          </a:prstGeom>
+        </p:spPr>
+        <p:style>
+          <a:lnRef idx="1">
+            <a:schemeClr val="accent1"/>
+          </a:lnRef>
+          <a:fillRef idx="0">
+            <a:schemeClr val="accent1"/>
+          </a:fillRef>
+          <a:effectRef idx="0">
+            <a:schemeClr val="accent1"/>
+          </a:effectRef>
+          <a:fontRef idx="minor">
+            <a:schemeClr val="tx1"/>
+          </a:fontRef>
+        </p:style>
+      </p:cxnSp>
+      <p:sp>
+        <p:nvSpPr>
+          <p:cNvPr id="11" name="Oval 10"/>
+          <p:cNvSpPr/>
+          <p:nvPr/>
+        </p:nvSpPr>
+        <p:spPr>
+          <a:xfrm>
+            <a:off x="3657596" y="4968234"/>
+            <a:ext cx="91440" cy="91440"/>
+          </a:xfrm>
+          <a:prstGeom prst="ellipse">
+            <a:avLst/>
+          </a:prstGeom>
+        </p:spPr>
+        <p:style>
+          <a:lnRef idx="2">
+            <a:schemeClr val="dk1">
+              <a:shade val="50000"/>
+            </a:schemeClr>
+          </a:lnRef>
+          <a:fillRef idx="1">
+            <a:schemeClr val="dk1"/>
+          </a:fillRef>
+          <a:effectRef idx="0">
+            <a:schemeClr val="dk1"/>
+          </a:effectRef>
+          <a:fontRef idx="minor">
+            <a:schemeClr val="lt1"/>
+          </a:fontRef>
+        </p:style>
+        <p:txBody>
+          <a:bodyPr rtlCol="0" anchor="ctr"/>
+          <a:lstStyle/>
+          <a:p>
+            <a:pPr algn="ctr"/>
+            <a:endParaRPr lang="en-US"/>
+          </a:p>
+        </p:txBody>
+      </p:sp>
+      <p:sp>
+        <p:nvSpPr>
+          <p:cNvPr id="12" name="TextBox 11"/>
+          <p:cNvSpPr txBox="1"/>
+          <p:nvPr/>
+        </p:nvSpPr>
+        <p:spPr>
+          <a:xfrm>
+            <a:off x="3657596" y="5034787"/>
+            <a:ext cx="758541" cy="246221"/>
+          </a:xfrm>
+          <a:prstGeom prst="rect">
+            <a:avLst/>
+          </a:prstGeom>
+          <a:noFill/>
+        </p:spPr>
+        <p:txBody>
+          <a:bodyPr wrap="none" rtlCol="0">
+            <a:spAutoFit/>
+          </a:bodyPr>
+          <a:lstStyle/>
+          <a:p>
+            <a:r>
+              <a:rPr lang="en-US" sz="1000" dirty="0" smtClean="0"/>
+              <a:t>NASA LFBB</a:t>
+            </a:r>
+            <a:endParaRPr lang="en-US" sz="1000" dirty="0"/>
+          </a:p>
+        </p:txBody>
+      </p:sp>
+      <p:sp>
+        <p:nvSpPr>
+          <p:cNvPr id="14" name="TextBox 13"/>
+          <p:cNvSpPr txBox="1"/>
+          <p:nvPr/>
+        </p:nvSpPr>
+        <p:spPr>
+          <a:xfrm>
+            <a:off x="1695199" y="1629489"/>
+            <a:ext cx="1962397" cy="246221"/>
+          </a:xfrm>
+          <a:prstGeom prst="rect">
+            <a:avLst/>
+          </a:prstGeom>
+          <a:noFill/>
+        </p:spPr>
+        <p:txBody>
+          <a:bodyPr wrap="none" rtlCol="0">
+            <a:spAutoFit/>
+          </a:bodyPr>
+          <a:lstStyle/>
+          <a:p>
+            <a:r>
+              <a:rPr lang="en-US" sz="1000" dirty="0" err="1" smtClean="0"/>
+              <a:t>Rocketback+prop</a:t>
+            </a:r>
+            <a:r>
+              <a:rPr lang="en-US" sz="1000" dirty="0" smtClean="0"/>
+              <a:t> </a:t>
+            </a:r>
+            <a:r>
+              <a:rPr lang="en-US" sz="1000" dirty="0" err="1" smtClean="0"/>
+              <a:t>entry+prop</a:t>
+            </a:r>
+            <a:r>
+              <a:rPr lang="en-US" sz="1000" dirty="0" smtClean="0"/>
+              <a:t> land</a:t>
+            </a:r>
+            <a:endParaRPr lang="en-US" sz="1000" dirty="0"/>
+          </a:p>
+        </p:txBody>
+      </p:sp>
+      <p:sp>
+        <p:nvSpPr>
+          <p:cNvPr id="15" name="Rectangle 14"/>
+          <p:cNvSpPr/>
+          <p:nvPr/>
+        </p:nvSpPr>
+        <p:spPr>
+          <a:xfrm>
+            <a:off x="1549403" y="1540933"/>
+            <a:ext cx="93131" cy="1303867"/>
+          </a:xfrm>
+          <a:prstGeom prst="rect">
+            <a:avLst/>
+          </a:prstGeom>
+          <a:solidFill>
+            <a:schemeClr val="accent6">
+              <a:lumMod val="40000"/>
+              <a:lumOff val="60000"/>
+            </a:schemeClr>
+          </a:solidFill>
+          <a:ln>
+            <a:solidFill>
+              <a:srgbClr val="FF0000"/>
+            </a:solidFill>
+          </a:ln>
+        </p:spPr>
+        <p:style>
+          <a:lnRef idx="2">
+            <a:schemeClr val="accent1">
+              <a:shade val="50000"/>
+            </a:schemeClr>
+          </a:lnRef>
+          <a:fillRef idx="1">
+            <a:schemeClr val="accent1"/>
+          </a:fillRef>
+          <a:effectRef idx="0">
+            <a:schemeClr val="accent1"/>
+          </a:effectRef>
+          <a:fontRef idx="minor">
+            <a:schemeClr val="lt1"/>
+          </a:fontRef>
+        </p:style>
+        <p:txBody>
+          <a:bodyPr rtlCol="0" anchor="ctr"/>
+          <a:lstStyle/>
+          <a:p>
+            <a:pPr algn="ctr"/>
+            <a:endParaRPr lang="en-US"/>
+          </a:p>
+        </p:txBody>
+      </p:sp>
+      <p:cxnSp>
+        <p:nvCxnSpPr>
+          <p:cNvPr id="17" name="Straight Connector 16"/>
+          <p:cNvCxnSpPr/>
+          <p:nvPr/>
+        </p:nvCxnSpPr>
+        <p:spPr>
+          <a:xfrm flipV="1">
+            <a:off x="1718733" y="1261534"/>
+            <a:ext cx="33867" cy="4350174"/>
+          </a:xfrm>
+          <a:prstGeom prst="line">
+            <a:avLst/>
+          </a:prstGeom>
+        </p:spPr>
+        <p:style>
+          <a:lnRef idx="1">
+            <a:schemeClr val="accent1"/>
+          </a:lnRef>
+          <a:fillRef idx="0">
+            <a:schemeClr val="accent1"/>
+          </a:fillRef>
+          <a:effectRef idx="0">
+            <a:schemeClr val="accent1"/>
+          </a:effectRef>
+          <a:fontRef idx="minor">
+            <a:schemeClr val="tx1"/>
+          </a:fontRef>
+        </p:style>
+      </p:cxnSp>
+      <p:sp>
+        <p:nvSpPr>
+          <p:cNvPr id="18" name="Freeform 17"/>
+          <p:cNvSpPr/>
+          <p:nvPr/>
+        </p:nvSpPr>
+        <p:spPr>
+          <a:xfrm>
+            <a:off x="1549403" y="4325916"/>
+            <a:ext cx="745064" cy="878696"/>
+          </a:xfrm>
+          <a:custGeom>
+            <a:avLst/>
+            <a:gdLst>
+              <a:gd name="connsiteX0" fmla="*/ 70044 w 1997542"/>
+              <a:gd name="connsiteY0" fmla="*/ 95965 h 1943618"/>
+              <a:gd name="connsiteX1" fmla="*/ 53111 w 1997542"/>
+              <a:gd name="connsiteY1" fmla="*/ 1027298 h 1943618"/>
+              <a:gd name="connsiteX2" fmla="*/ 738911 w 1997542"/>
+              <a:gd name="connsiteY2" fmla="*/ 1873965 h 1943618"/>
+              <a:gd name="connsiteX3" fmla="*/ 1873444 w 1997542"/>
+              <a:gd name="connsiteY3" fmla="*/ 1840098 h 1943618"/>
+              <a:gd name="connsiteX4" fmla="*/ 1856511 w 1997542"/>
+              <a:gd name="connsiteY4" fmla="*/ 1399831 h 1943618"/>
+              <a:gd name="connsiteX5" fmla="*/ 882844 w 1997542"/>
+              <a:gd name="connsiteY5" fmla="*/ 1238965 h 1943618"/>
+              <a:gd name="connsiteX6" fmla="*/ 264778 w 1997542"/>
+              <a:gd name="connsiteY6" fmla="*/ 155231 h 1943618"/>
+              <a:gd name="connsiteX7" fmla="*/ 70044 w 1997542"/>
+              <a:gd name="connsiteY7" fmla="*/ 95965 h 1943618"/>
+            </a:gdLst>
+            <a:ahLst/>
+            <a:cxnLst>
+              <a:cxn ang="0">
+                <a:pos x="connsiteX0" y="connsiteY0"/>
+              </a:cxn>
+              <a:cxn ang="0">
+                <a:pos x="connsiteX1" y="connsiteY1"/>
+              </a:cxn>
+              <a:cxn ang="0">
+                <a:pos x="connsiteX2" y="connsiteY2"/>
+              </a:cxn>
+              <a:cxn ang="0">
+                <a:pos x="connsiteX3" y="connsiteY3"/>
+              </a:cxn>
+              <a:cxn ang="0">
+                <a:pos x="connsiteX4" y="connsiteY4"/>
+              </a:cxn>
+              <a:cxn ang="0">
+                <a:pos x="connsiteX5" y="connsiteY5"/>
+              </a:cxn>
+              <a:cxn ang="0">
+                <a:pos x="connsiteX6" y="connsiteY6"/>
+              </a:cxn>
+              <a:cxn ang="0">
+                <a:pos x="connsiteX7" y="connsiteY7"/>
+              </a:cxn>
+            </a:cxnLst>
+            <a:rect l="l" t="t" r="r" b="b"/>
+            <a:pathLst>
+              <a:path w="1997542" h="1943618">
+                <a:moveTo>
+                  <a:pt x="70044" y="95965"/>
+                </a:moveTo>
+                <a:cubicBezTo>
+                  <a:pt x="34766" y="241310"/>
+                  <a:pt x="-58367" y="730965"/>
+                  <a:pt x="53111" y="1027298"/>
+                </a:cubicBezTo>
+                <a:cubicBezTo>
+                  <a:pt x="164589" y="1323631"/>
+                  <a:pt x="435522" y="1738498"/>
+                  <a:pt x="738911" y="1873965"/>
+                </a:cubicBezTo>
+                <a:cubicBezTo>
+                  <a:pt x="1042300" y="2009432"/>
+                  <a:pt x="1687177" y="1919120"/>
+                  <a:pt x="1873444" y="1840098"/>
+                </a:cubicBezTo>
+                <a:cubicBezTo>
+                  <a:pt x="2059711" y="1761076"/>
+                  <a:pt x="2021611" y="1500020"/>
+                  <a:pt x="1856511" y="1399831"/>
+                </a:cubicBezTo>
+                <a:cubicBezTo>
+                  <a:pt x="1691411" y="1299642"/>
+                  <a:pt x="1148133" y="1446398"/>
+                  <a:pt x="882844" y="1238965"/>
+                </a:cubicBezTo>
+                <a:cubicBezTo>
+                  <a:pt x="617555" y="1031532"/>
+                  <a:pt x="397422" y="340087"/>
+                  <a:pt x="264778" y="155231"/>
+                </a:cubicBezTo>
+                <a:cubicBezTo>
+                  <a:pt x="132134" y="-29625"/>
+                  <a:pt x="105322" y="-49380"/>
+                  <a:pt x="70044" y="95965"/>
+                </a:cubicBezTo>
+                <a:close/>
+              </a:path>
+            </a:pathLst>
+          </a:custGeom>
+          <a:solidFill>
+            <a:schemeClr val="accent1">
+              <a:lumMod val="40000"/>
+              <a:lumOff val="60000"/>
+            </a:schemeClr>
+          </a:solidFill>
+          <a:ln>
+            <a:solidFill>
+              <a:srgbClr val="FF0000"/>
+            </a:solidFill>
+          </a:ln>
+        </p:spPr>
+        <p:style>
+          <a:lnRef idx="2">
+            <a:schemeClr val="accent1">
+              <a:shade val="50000"/>
+            </a:schemeClr>
+          </a:lnRef>
+          <a:fillRef idx="1">
+            <a:schemeClr val="accent1"/>
+          </a:fillRef>
+          <a:effectRef idx="0">
+            <a:schemeClr val="accent1"/>
+          </a:effectRef>
+          <a:fontRef idx="minor">
+            <a:schemeClr val="lt1"/>
+          </a:fontRef>
+        </p:style>
+        <p:txBody>
+          <a:bodyPr rtlCol="0" anchor="ctr"/>
+          <a:lstStyle/>
+          <a:p>
+            <a:pPr algn="ctr"/>
+            <a:endParaRPr lang="en-US"/>
+          </a:p>
+        </p:txBody>
+      </p:sp>
+      <p:sp>
+        <p:nvSpPr>
+          <p:cNvPr id="19" name="TextBox 18"/>
+          <p:cNvSpPr txBox="1"/>
+          <p:nvPr/>
+        </p:nvSpPr>
+        <p:spPr>
+          <a:xfrm>
+            <a:off x="4869682" y="5408675"/>
+            <a:ext cx="1305165" cy="246221"/>
+          </a:xfrm>
+          <a:prstGeom prst="rect">
+            <a:avLst/>
+          </a:prstGeom>
+          <a:noFill/>
+        </p:spPr>
+        <p:txBody>
+          <a:bodyPr wrap="none" rtlCol="0">
+            <a:spAutoFit/>
+          </a:bodyPr>
+          <a:lstStyle/>
+          <a:p>
+            <a:r>
+              <a:rPr lang="en-US" sz="1000" dirty="0" smtClean="0"/>
+              <a:t>Aero </a:t>
+            </a:r>
+            <a:r>
+              <a:rPr lang="en-US" sz="1000" dirty="0" err="1" smtClean="0"/>
+              <a:t>entry+prop</a:t>
+            </a:r>
+            <a:r>
+              <a:rPr lang="en-US" sz="1000" dirty="0" smtClean="0"/>
+              <a:t> land</a:t>
+            </a:r>
+            <a:endParaRPr lang="en-US" sz="1000" dirty="0"/>
+          </a:p>
+        </p:txBody>
+      </p:sp>
+      <p:sp>
+        <p:nvSpPr>
+          <p:cNvPr id="20" name="TextBox 19"/>
+          <p:cNvSpPr txBox="1"/>
+          <p:nvPr/>
+        </p:nvSpPr>
+        <p:spPr>
+          <a:xfrm>
+            <a:off x="1425539" y="4257873"/>
+            <a:ext cx="1301959" cy="246221"/>
+          </a:xfrm>
+          <a:prstGeom prst="rect">
+            <a:avLst/>
+          </a:prstGeom>
+          <a:noFill/>
+        </p:spPr>
+        <p:txBody>
+          <a:bodyPr wrap="none" rtlCol="0">
+            <a:spAutoFit/>
+          </a:bodyPr>
+          <a:lstStyle/>
+          <a:p>
+            <a:r>
+              <a:rPr lang="en-US" sz="1000" dirty="0" smtClean="0"/>
+              <a:t>prop </a:t>
+            </a:r>
+            <a:r>
+              <a:rPr lang="en-US" sz="1000" dirty="0" err="1" smtClean="0"/>
+              <a:t>entry+prop</a:t>
+            </a:r>
+            <a:r>
+              <a:rPr lang="en-US" sz="1000" dirty="0" smtClean="0"/>
+              <a:t> land</a:t>
+            </a:r>
+            <a:endParaRPr lang="en-US" sz="1000" dirty="0"/>
+          </a:p>
+        </p:txBody>
+      </p:sp>
+      <p:sp>
+        <p:nvSpPr>
+          <p:cNvPr id="21" name="TextBox 20"/>
+          <p:cNvSpPr txBox="1"/>
+          <p:nvPr/>
+        </p:nvSpPr>
+        <p:spPr>
+          <a:xfrm>
+            <a:off x="1390810" y="4917962"/>
+            <a:ext cx="1305165" cy="246221"/>
+          </a:xfrm>
+          <a:prstGeom prst="rect">
+            <a:avLst/>
+          </a:prstGeom>
+          <a:noFill/>
+        </p:spPr>
+        <p:txBody>
+          <a:bodyPr wrap="none" rtlCol="0">
+            <a:spAutoFit/>
+          </a:bodyPr>
+          <a:lstStyle/>
+          <a:p>
+            <a:r>
+              <a:rPr lang="en-US" sz="1000" dirty="0" smtClean="0"/>
+              <a:t>Aero </a:t>
+            </a:r>
+            <a:r>
+              <a:rPr lang="en-US" sz="1000" dirty="0" err="1" smtClean="0"/>
+              <a:t>entry+prop</a:t>
+            </a:r>
+            <a:r>
+              <a:rPr lang="en-US" sz="1000" dirty="0" smtClean="0"/>
+              <a:t> land</a:t>
+            </a:r>
+            <a:endParaRPr lang="en-US" sz="1000" dirty="0"/>
+          </a:p>
+        </p:txBody>
+      </p:sp>
+      <p:sp>
+        <p:nvSpPr>
+          <p:cNvPr id="22" name="Rectangle 21"/>
+          <p:cNvSpPr/>
+          <p:nvPr/>
+        </p:nvSpPr>
+        <p:spPr>
+          <a:xfrm>
+            <a:off x="7506209" y="5504504"/>
+            <a:ext cx="1005840" cy="91440"/>
+          </a:xfrm>
+          <a:prstGeom prst="rect">
+            <a:avLst/>
+          </a:prstGeom>
+          <a:solidFill>
+            <a:schemeClr val="accent1">
+              <a:lumMod val="40000"/>
+              <a:lumOff val="60000"/>
+            </a:schemeClr>
+          </a:solidFill>
+        </p:spPr>
+        <p:style>
+          <a:lnRef idx="2">
+            <a:schemeClr val="accent1">
+              <a:shade val="50000"/>
+            </a:schemeClr>
+          </a:lnRef>
+          <a:fillRef idx="1">
+            <a:schemeClr val="accent1"/>
+          </a:fillRef>
+          <a:effectRef idx="0">
+            <a:schemeClr val="accent1"/>
+          </a:effectRef>
+          <a:fontRef idx="minor">
+            <a:schemeClr val="lt1"/>
+          </a:fontRef>
+        </p:style>
+        <p:txBody>
+          <a:bodyPr rtlCol="0" anchor="ctr"/>
+          <a:lstStyle/>
+          <a:p>
+            <a:pPr algn="ctr"/>
+            <a:endParaRPr lang="en-US"/>
+          </a:p>
+        </p:txBody>
+      </p:sp>
+      <p:sp>
+        <p:nvSpPr>
+          <p:cNvPr id="23" name="TextBox 22"/>
+          <p:cNvSpPr txBox="1"/>
+          <p:nvPr/>
+        </p:nvSpPr>
+        <p:spPr>
+          <a:xfrm>
+            <a:off x="7506209" y="5304003"/>
+            <a:ext cx="856325" cy="246221"/>
+          </a:xfrm>
+          <a:prstGeom prst="rect">
+            <a:avLst/>
+          </a:prstGeom>
+          <a:noFill/>
+        </p:spPr>
+        <p:txBody>
+          <a:bodyPr wrap="none" rtlCol="0">
+            <a:spAutoFit/>
+          </a:bodyPr>
+          <a:lstStyle/>
+          <a:p>
+            <a:r>
+              <a:rPr lang="en-US" sz="1000" dirty="0" smtClean="0"/>
+              <a:t>Wing (glider)</a:t>
+            </a:r>
+            <a:endParaRPr lang="en-US" sz="1000" dirty="0"/>
+          </a:p>
+        </p:txBody>
+      </p:sp>
+      <p:sp>
+        <p:nvSpPr>
+          <p:cNvPr id="24" name="Rectangle 23"/>
+          <p:cNvSpPr/>
+          <p:nvPr/>
+        </p:nvSpPr>
+        <p:spPr>
+          <a:xfrm>
+            <a:off x="8009129" y="4893205"/>
+            <a:ext cx="1078352" cy="213364"/>
+          </a:xfrm>
+          <a:prstGeom prst="rect">
+            <a:avLst/>
+          </a:prstGeom>
+          <a:solidFill>
+            <a:schemeClr val="accent6">
+              <a:lumMod val="40000"/>
+              <a:lumOff val="60000"/>
+            </a:schemeClr>
+          </a:solidFill>
+        </p:spPr>
+        <p:style>
+          <a:lnRef idx="2">
+            <a:schemeClr val="accent1">
+              <a:shade val="50000"/>
+            </a:schemeClr>
+          </a:lnRef>
+          <a:fillRef idx="1">
+            <a:schemeClr val="accent1"/>
+          </a:fillRef>
+          <a:effectRef idx="0">
+            <a:schemeClr val="accent1"/>
+          </a:effectRef>
+          <a:fontRef idx="minor">
+            <a:schemeClr val="lt1"/>
+          </a:fontRef>
+        </p:style>
+        <p:txBody>
+          <a:bodyPr rtlCol="0" anchor="ctr"/>
+          <a:lstStyle/>
+          <a:p>
+            <a:pPr algn="ctr"/>
+            <a:endParaRPr lang="en-US"/>
+          </a:p>
+        </p:txBody>
+      </p:sp>
+      <p:sp>
+        <p:nvSpPr>
+          <p:cNvPr id="25" name="TextBox 24"/>
+          <p:cNvSpPr txBox="1"/>
+          <p:nvPr/>
+        </p:nvSpPr>
+        <p:spPr>
+          <a:xfrm>
+            <a:off x="7928584" y="4875606"/>
+            <a:ext cx="1239442" cy="246221"/>
+          </a:xfrm>
+          <a:prstGeom prst="rect">
+            <a:avLst/>
+          </a:prstGeom>
+          <a:noFill/>
+        </p:spPr>
+        <p:txBody>
+          <a:bodyPr wrap="none" rtlCol="0">
+            <a:spAutoFit/>
+          </a:bodyPr>
+          <a:lstStyle/>
+          <a:p>
+            <a:r>
+              <a:rPr lang="en-US" sz="1000" dirty="0" smtClean="0"/>
+              <a:t>Wing (air-breathing)</a:t>
+            </a:r>
+            <a:endParaRPr lang="en-US" sz="1000" dirty="0"/>
+          </a:p>
+        </p:txBody>
+      </p:sp>
+    </p:spTree>
+    <p:extLst>
+      <p:ext uri="{BB962C8B-B14F-4D97-AF65-F5344CB8AC3E}">
+        <p14:creationId xmlns:p14="http://schemas.microsoft.com/office/powerpoint/2010/main" val="2797165538"/>
+      </p:ext>
+    </p:extLst>
+  </p:cSld>
+  <p:clrMapOvr>
+    <a:masterClrMapping/>
+  </p:clrMapOvr>
+</p:sld>
+</file>
+
 <file path=ppt/theme/theme1.xml><?xml version="1.0" encoding="utf-8"?>
 <a:theme xmlns:a="http://schemas.openxmlformats.org/drawingml/2006/main" name="Office Theme">
   <a:themeElements>

</xml_diff>